<commit_message>
Deployed 7410c6a with MkDocs version: 1.1.2
</commit_message>
<xml_diff>
--- a/mbot/mBlock-concept-cards.pptx
+++ b/mbot/mBlock-concept-cards.pptx
@@ -111,6 +111,11 @@
       </a:defRPr>
     </a:lvl9pPr>
   </p:defaultTextStyle>
+  <p:extLst>
+    <p:ext uri="{EFAFB233-063F-42B5-8137-9DF3F51BA10A}">
+      <p15:sldGuideLst xmlns:p15="http://schemas.microsoft.com/office/powerpoint/2012/main"/>
+    </p:ext>
+  </p:extLst>
 </p:presentation>
 </file>
 
@@ -196,7 +201,7 @@
           <a:p>
             <a:fld id="{6669A8CB-489D-5B47-B2EE-BF121A3EE8C1}" type="datetimeFigureOut">
               <a:rPr lang="en-US" smtClean="0"/>
-              <a:t>3/9/19</a:t>
+              <a:t>8/13/20</a:t>
             </a:fld>
             <a:endParaRPr lang="en-US"/>
           </a:p>
@@ -260,38 +265,37 @@
           <a:p>
             <a:pPr lvl="0"/>
             <a:r>
-              <a:rPr lang="en-US" smtClean="0"/>
+              <a:rPr lang="en-US"/>
               <a:t>Click to edit Master text styles</a:t>
             </a:r>
           </a:p>
           <a:p>
             <a:pPr lvl="1"/>
             <a:r>
-              <a:rPr lang="en-US" smtClean="0"/>
+              <a:rPr lang="en-US"/>
               <a:t>Second level</a:t>
             </a:r>
           </a:p>
           <a:p>
             <a:pPr lvl="2"/>
             <a:r>
-              <a:rPr lang="en-US" smtClean="0"/>
+              <a:rPr lang="en-US"/>
               <a:t>Third level</a:t>
             </a:r>
           </a:p>
           <a:p>
             <a:pPr lvl="3"/>
             <a:r>
-              <a:rPr lang="en-US" smtClean="0"/>
+              <a:rPr lang="en-US"/>
               <a:t>Fourth level</a:t>
             </a:r>
           </a:p>
           <a:p>
             <a:pPr lvl="4"/>
             <a:r>
-              <a:rPr lang="en-US" smtClean="0"/>
+              <a:rPr lang="en-US"/>
               <a:t>Fifth level</a:t>
             </a:r>
-            <a:endParaRPr lang="en-US"/>
           </a:p>
         </p:txBody>
       </p:sp>
@@ -498,7 +502,7 @@
           <a:p>
             <a:fld id="{CE60EA3C-8612-9948-B395-77401CBBBD2E}" type="datetimeFigureOut">
               <a:rPr lang="en-US" smtClean="0"/>
-              <a:t>3/9/19</a:t>
+              <a:t>8/13/20</a:t>
             </a:fld>
             <a:endParaRPr lang="en-US"/>
           </a:p>
@@ -673,18 +677,13 @@
             <a:lstStyle/>
             <a:p>
               <a:r>
-                <a:rPr lang="en-US" b="1" dirty="0" smtClean="0">
+                <a:rPr lang="en-US" b="1" dirty="0">
                   <a:solidFill>
                     <a:schemeClr val="bg1"/>
                   </a:solidFill>
                 </a:rPr>
                 <a:t>Beginner</a:t>
               </a:r>
-              <a:endParaRPr lang="en-US" b="1" dirty="0">
-                <a:solidFill>
-                  <a:schemeClr val="bg1"/>
-                </a:solidFill>
-              </a:endParaRPr>
             </a:p>
           </p:txBody>
         </p:sp>
@@ -816,18 +815,13 @@
             <a:lstStyle/>
             <a:p>
               <a:r>
-                <a:rPr lang="en-US" b="1" smtClean="0">
+                <a:rPr lang="en-US" b="1">
                   <a:solidFill>
                     <a:schemeClr val="bg1"/>
                   </a:solidFill>
                 </a:rPr>
                 <a:t>Beginner</a:t>
               </a:r>
-              <a:endParaRPr lang="en-US" b="1">
-                <a:solidFill>
-                  <a:schemeClr val="bg1"/>
-                </a:solidFill>
-              </a:endParaRPr>
             </a:p>
           </p:txBody>
         </p:sp>
@@ -855,7 +849,7 @@
           <a:lstStyle/>
           <a:p>
             <a:r>
-              <a:rPr lang="en-US" sz="1400" dirty="0" err="1" smtClean="0">
+              <a:rPr lang="en-US" sz="1400" dirty="0" err="1">
                 <a:solidFill>
                   <a:schemeClr val="bg1"/>
                 </a:solidFill>
@@ -863,7 +857,7 @@
               <a:t>mBlock</a:t>
             </a:r>
             <a:r>
-              <a:rPr lang="en-US" sz="1400" baseline="0" dirty="0" smtClean="0">
+              <a:rPr lang="en-US" sz="1400" baseline="0" dirty="0">
                 <a:solidFill>
                   <a:schemeClr val="bg1"/>
                 </a:solidFill>
@@ -871,7 +865,7 @@
               <a:t> Concept Cards </a:t>
             </a:r>
             <a:r>
-              <a:rPr lang="mr-IN" sz="1400" baseline="0" dirty="0" smtClean="0">
+              <a:rPr lang="mr-IN" sz="1400" baseline="0" dirty="0">
                 <a:solidFill>
                   <a:schemeClr val="bg1"/>
                 </a:solidFill>
@@ -879,7 +873,7 @@
               <a:t>–</a:t>
             </a:r>
             <a:r>
-              <a:rPr lang="en-US" sz="1400" baseline="0" dirty="0" smtClean="0">
+              <a:rPr lang="en-US" sz="1400" baseline="0" dirty="0">
                 <a:solidFill>
                   <a:schemeClr val="bg1"/>
                 </a:solidFill>
@@ -887,7 +881,7 @@
               <a:t> </a:t>
             </a:r>
             <a:r>
-              <a:rPr lang="en-US" sz="1400" baseline="0" dirty="0" err="1" smtClean="0">
+              <a:rPr lang="en-US" sz="1400" baseline="0" dirty="0" err="1">
                 <a:solidFill>
                   <a:schemeClr val="bg1"/>
                 </a:solidFill>
@@ -895,7 +889,7 @@
               <a:t>github</a:t>
             </a:r>
             <a:r>
-              <a:rPr lang="en-US" sz="1400" baseline="0" dirty="0" smtClean="0">
+              <a:rPr lang="en-US" sz="1400" baseline="0" dirty="0">
                 <a:solidFill>
                   <a:schemeClr val="bg1"/>
                 </a:solidFill>
@@ -903,7 +897,7 @@
               <a:t>/</a:t>
             </a:r>
             <a:r>
-              <a:rPr lang="en-US" sz="1400" baseline="0" dirty="0" err="1" smtClean="0">
+              <a:rPr lang="en-US" sz="1400" baseline="0" dirty="0" err="1">
                 <a:solidFill>
                   <a:schemeClr val="bg1"/>
                 </a:solidFill>
@@ -911,7 +905,7 @@
               <a:t>dmccreary</a:t>
             </a:r>
             <a:r>
-              <a:rPr lang="en-US" sz="1400" baseline="0" dirty="0" smtClean="0">
+              <a:rPr lang="en-US" sz="1400" baseline="0" dirty="0">
                 <a:solidFill>
                   <a:schemeClr val="bg1"/>
                 </a:solidFill>
@@ -919,7 +913,7 @@
               <a:t>/</a:t>
             </a:r>
             <a:r>
-              <a:rPr lang="en-US" sz="1400" baseline="0" dirty="0" err="1" smtClean="0">
+              <a:rPr lang="en-US" sz="1400" baseline="0" dirty="0" err="1">
                 <a:solidFill>
                   <a:schemeClr val="bg1"/>
                 </a:solidFill>
@@ -927,7 +921,7 @@
               <a:t>coderdojo</a:t>
             </a:r>
             <a:r>
-              <a:rPr lang="en-US" sz="1400" baseline="0" dirty="0" smtClean="0">
+              <a:rPr lang="en-US" sz="1400" baseline="0" dirty="0">
                 <a:solidFill>
                   <a:schemeClr val="bg1"/>
                 </a:solidFill>
@@ -965,7 +959,7 @@
           <a:lstStyle/>
           <a:p>
             <a:r>
-              <a:rPr lang="en-US" sz="1400" dirty="0" err="1" smtClean="0">
+              <a:rPr lang="en-US" sz="1400" dirty="0" err="1">
                 <a:solidFill>
                   <a:schemeClr val="bg1"/>
                 </a:solidFill>
@@ -973,7 +967,7 @@
               <a:t>mBlock</a:t>
             </a:r>
             <a:r>
-              <a:rPr lang="en-US" sz="1400" baseline="0" dirty="0" smtClean="0">
+              <a:rPr lang="en-US" sz="1400" baseline="0" dirty="0">
                 <a:solidFill>
                   <a:schemeClr val="bg1"/>
                 </a:solidFill>
@@ -981,7 +975,7 @@
               <a:t> Concept Cards </a:t>
             </a:r>
             <a:r>
-              <a:rPr lang="mr-IN" sz="1400" baseline="0" dirty="0" smtClean="0">
+              <a:rPr lang="mr-IN" sz="1400" baseline="0" dirty="0">
                 <a:solidFill>
                   <a:schemeClr val="bg1"/>
                 </a:solidFill>
@@ -989,7 +983,7 @@
               <a:t>–</a:t>
             </a:r>
             <a:r>
-              <a:rPr lang="en-US" sz="1400" baseline="0" dirty="0" smtClean="0">
+              <a:rPr lang="en-US" sz="1400" baseline="0" dirty="0">
                 <a:solidFill>
                   <a:schemeClr val="bg1"/>
                 </a:solidFill>
@@ -997,7 +991,7 @@
               <a:t> </a:t>
             </a:r>
             <a:r>
-              <a:rPr lang="en-US" sz="1400" baseline="0" dirty="0" err="1" smtClean="0">
+              <a:rPr lang="en-US" sz="1400" baseline="0" dirty="0" err="1">
                 <a:solidFill>
                   <a:schemeClr val="bg1"/>
                 </a:solidFill>
@@ -1005,7 +999,7 @@
               <a:t>github</a:t>
             </a:r>
             <a:r>
-              <a:rPr lang="en-US" sz="1400" baseline="0" dirty="0" smtClean="0">
+              <a:rPr lang="en-US" sz="1400" baseline="0" dirty="0">
                 <a:solidFill>
                   <a:schemeClr val="bg1"/>
                 </a:solidFill>
@@ -1013,7 +1007,7 @@
               <a:t>/</a:t>
             </a:r>
             <a:r>
-              <a:rPr lang="en-US" sz="1400" baseline="0" dirty="0" err="1" smtClean="0">
+              <a:rPr lang="en-US" sz="1400" baseline="0" dirty="0" err="1">
                 <a:solidFill>
                   <a:schemeClr val="bg1"/>
                 </a:solidFill>
@@ -1021,7 +1015,7 @@
               <a:t>dmccreary</a:t>
             </a:r>
             <a:r>
-              <a:rPr lang="en-US" sz="1400" baseline="0" dirty="0" smtClean="0">
+              <a:rPr lang="en-US" sz="1400" baseline="0" dirty="0">
                 <a:solidFill>
                   <a:schemeClr val="bg1"/>
                 </a:solidFill>
@@ -1029,7 +1023,7 @@
               <a:t>/</a:t>
             </a:r>
             <a:r>
-              <a:rPr lang="en-US" sz="1400" baseline="0" dirty="0" err="1" smtClean="0">
+              <a:rPr lang="en-US" sz="1400" baseline="0" dirty="0" err="1">
                 <a:solidFill>
                   <a:schemeClr val="bg1"/>
                 </a:solidFill>
@@ -1037,7 +1031,7 @@
               <a:t>coderdojo</a:t>
             </a:r>
             <a:r>
-              <a:rPr lang="en-US" sz="1400" baseline="0" dirty="0" smtClean="0">
+              <a:rPr lang="en-US" sz="1400" baseline="0" dirty="0">
                 <a:solidFill>
                   <a:schemeClr val="bg1"/>
                 </a:solidFill>
@@ -1107,10 +1101,9 @@
           </a:lstStyle>
           <a:p>
             <a:r>
-              <a:rPr lang="en-US" smtClean="0"/>
+              <a:rPr lang="en-US"/>
               <a:t>Click to edit Master title style</a:t>
             </a:r>
-            <a:endParaRPr lang="en-US"/>
           </a:p>
         </p:txBody>
       </p:sp>
@@ -1164,38 +1157,37 @@
           <a:p>
             <a:pPr lvl="0"/>
             <a:r>
-              <a:rPr lang="en-US" smtClean="0"/>
+              <a:rPr lang="en-US"/>
               <a:t>Click to edit Master text styles</a:t>
             </a:r>
           </a:p>
           <a:p>
             <a:pPr lvl="1"/>
             <a:r>
-              <a:rPr lang="en-US" smtClean="0"/>
+              <a:rPr lang="en-US"/>
               <a:t>Second level</a:t>
             </a:r>
           </a:p>
           <a:p>
             <a:pPr lvl="2"/>
             <a:r>
-              <a:rPr lang="en-US" smtClean="0"/>
+              <a:rPr lang="en-US"/>
               <a:t>Third level</a:t>
             </a:r>
           </a:p>
           <a:p>
             <a:pPr lvl="3"/>
             <a:r>
-              <a:rPr lang="en-US" smtClean="0"/>
+              <a:rPr lang="en-US"/>
               <a:t>Fourth level</a:t>
             </a:r>
           </a:p>
           <a:p>
             <a:pPr lvl="4"/>
             <a:r>
-              <a:rPr lang="en-US" smtClean="0"/>
+              <a:rPr lang="en-US"/>
               <a:t>Fifth level</a:t>
             </a:r>
-            <a:endParaRPr lang="en-US"/>
           </a:p>
         </p:txBody>
       </p:sp>
@@ -1258,7 +1250,7 @@
           <a:p>
             <a:pPr lvl="0"/>
             <a:r>
-              <a:rPr lang="en-US" smtClean="0"/>
+              <a:rPr lang="en-US"/>
               <a:t>Click to edit Master text styles</a:t>
             </a:r>
           </a:p>
@@ -1281,7 +1273,7 @@
           <a:p>
             <a:fld id="{CE60EA3C-8612-9948-B395-77401CBBBD2E}" type="datetimeFigureOut">
               <a:rPr lang="en-US" smtClean="0"/>
-              <a:t>3/9/19</a:t>
+              <a:t>8/13/20</a:t>
             </a:fld>
             <a:endParaRPr lang="en-US"/>
           </a:p>
@@ -1384,10 +1376,9 @@
           </a:lstStyle>
           <a:p>
             <a:r>
-              <a:rPr lang="en-US" smtClean="0"/>
+              <a:rPr lang="en-US"/>
               <a:t>Click to edit Master title style</a:t>
             </a:r>
-            <a:endParaRPr lang="en-US"/>
           </a:p>
         </p:txBody>
       </p:sp>
@@ -1511,7 +1502,7 @@
           <a:p>
             <a:pPr lvl="0"/>
             <a:r>
-              <a:rPr lang="en-US" smtClean="0"/>
+              <a:rPr lang="en-US"/>
               <a:t>Click to edit Master text styles</a:t>
             </a:r>
           </a:p>
@@ -1534,7 +1525,7 @@
           <a:p>
             <a:fld id="{CE60EA3C-8612-9948-B395-77401CBBBD2E}" type="datetimeFigureOut">
               <a:rPr lang="en-US" smtClean="0"/>
-              <a:t>3/9/19</a:t>
+              <a:t>8/13/20</a:t>
             </a:fld>
             <a:endParaRPr lang="en-US"/>
           </a:p>
@@ -1628,10 +1619,9 @@
           <a:lstStyle/>
           <a:p>
             <a:r>
-              <a:rPr lang="en-US" smtClean="0"/>
+              <a:rPr lang="en-US"/>
               <a:t>Click to edit Master title style</a:t>
             </a:r>
-            <a:endParaRPr lang="en-US"/>
           </a:p>
         </p:txBody>
       </p:sp>
@@ -1652,38 +1642,37 @@
           <a:p>
             <a:pPr lvl="0"/>
             <a:r>
-              <a:rPr lang="en-US" smtClean="0"/>
+              <a:rPr lang="en-US"/>
               <a:t>Click to edit Master text styles</a:t>
             </a:r>
           </a:p>
           <a:p>
             <a:pPr lvl="1"/>
             <a:r>
-              <a:rPr lang="en-US" smtClean="0"/>
+              <a:rPr lang="en-US"/>
               <a:t>Second level</a:t>
             </a:r>
           </a:p>
           <a:p>
             <a:pPr lvl="2"/>
             <a:r>
-              <a:rPr lang="en-US" smtClean="0"/>
+              <a:rPr lang="en-US"/>
               <a:t>Third level</a:t>
             </a:r>
           </a:p>
           <a:p>
             <a:pPr lvl="3"/>
             <a:r>
-              <a:rPr lang="en-US" smtClean="0"/>
+              <a:rPr lang="en-US"/>
               <a:t>Fourth level</a:t>
             </a:r>
           </a:p>
           <a:p>
             <a:pPr lvl="4"/>
             <a:r>
-              <a:rPr lang="en-US" smtClean="0"/>
+              <a:rPr lang="en-US"/>
               <a:t>Fifth level</a:t>
             </a:r>
-            <a:endParaRPr lang="en-US"/>
           </a:p>
         </p:txBody>
       </p:sp>
@@ -1704,7 +1693,7 @@
           <a:p>
             <a:fld id="{CE60EA3C-8612-9948-B395-77401CBBBD2E}" type="datetimeFigureOut">
               <a:rPr lang="en-US" smtClean="0"/>
-              <a:t>3/9/19</a:t>
+              <a:t>8/13/20</a:t>
             </a:fld>
             <a:endParaRPr lang="en-US"/>
           </a:p>
@@ -1803,10 +1792,9 @@
           <a:lstStyle/>
           <a:p>
             <a:r>
-              <a:rPr lang="en-US" smtClean="0"/>
+              <a:rPr lang="en-US"/>
               <a:t>Click to edit Master title style</a:t>
             </a:r>
-            <a:endParaRPr lang="en-US"/>
           </a:p>
         </p:txBody>
       </p:sp>
@@ -1832,38 +1820,37 @@
           <a:p>
             <a:pPr lvl="0"/>
             <a:r>
-              <a:rPr lang="en-US" smtClean="0"/>
+              <a:rPr lang="en-US"/>
               <a:t>Click to edit Master text styles</a:t>
             </a:r>
           </a:p>
           <a:p>
             <a:pPr lvl="1"/>
             <a:r>
-              <a:rPr lang="en-US" smtClean="0"/>
+              <a:rPr lang="en-US"/>
               <a:t>Second level</a:t>
             </a:r>
           </a:p>
           <a:p>
             <a:pPr lvl="2"/>
             <a:r>
-              <a:rPr lang="en-US" smtClean="0"/>
+              <a:rPr lang="en-US"/>
               <a:t>Third level</a:t>
             </a:r>
           </a:p>
           <a:p>
             <a:pPr lvl="3"/>
             <a:r>
-              <a:rPr lang="en-US" smtClean="0"/>
+              <a:rPr lang="en-US"/>
               <a:t>Fourth level</a:t>
             </a:r>
           </a:p>
           <a:p>
             <a:pPr lvl="4"/>
             <a:r>
-              <a:rPr lang="en-US" smtClean="0"/>
+              <a:rPr lang="en-US"/>
               <a:t>Fifth level</a:t>
             </a:r>
-            <a:endParaRPr lang="en-US"/>
           </a:p>
         </p:txBody>
       </p:sp>
@@ -1884,7 +1871,7 @@
           <a:p>
             <a:fld id="{CE60EA3C-8612-9948-B395-77401CBBBD2E}" type="datetimeFigureOut">
               <a:rPr lang="en-US" smtClean="0"/>
-              <a:t>3/9/19</a:t>
+              <a:t>8/13/20</a:t>
             </a:fld>
             <a:endParaRPr lang="en-US"/>
           </a:p>
@@ -1979,7 +1966,7 @@
           <a:p>
             <a:fld id="{CE60EA3C-8612-9948-B395-77401CBBBD2E}" type="datetimeFigureOut">
               <a:rPr lang="en-US" smtClean="0"/>
-              <a:t>3/9/19</a:t>
+              <a:t>8/13/20</a:t>
             </a:fld>
             <a:endParaRPr lang="en-US"/>
           </a:p>
@@ -2154,18 +2141,13 @@
             <a:lstStyle/>
             <a:p>
               <a:r>
-                <a:rPr lang="en-US" b="1" dirty="0" smtClean="0">
+                <a:rPr lang="en-US" b="1" dirty="0">
                   <a:solidFill>
                     <a:schemeClr val="bg1"/>
                   </a:solidFill>
                 </a:rPr>
                 <a:t>Advanced</a:t>
               </a:r>
-              <a:endParaRPr lang="en-US" b="1" dirty="0">
-                <a:solidFill>
-                  <a:schemeClr val="bg1"/>
-                </a:solidFill>
-              </a:endParaRPr>
             </a:p>
           </p:txBody>
         </p:sp>
@@ -2297,18 +2279,13 @@
             <a:lstStyle/>
             <a:p>
               <a:r>
-                <a:rPr lang="en-US" b="1" dirty="0" smtClean="0">
+                <a:rPr lang="en-US" b="1" dirty="0">
                   <a:solidFill>
                     <a:schemeClr val="bg1"/>
                   </a:solidFill>
                 </a:rPr>
                 <a:t>Advanced</a:t>
               </a:r>
-              <a:endParaRPr lang="en-US" b="1" dirty="0">
-                <a:solidFill>
-                  <a:schemeClr val="bg1"/>
-                </a:solidFill>
-              </a:endParaRPr>
             </a:p>
           </p:txBody>
         </p:sp>
@@ -2336,7 +2313,7 @@
           <a:lstStyle/>
           <a:p>
             <a:r>
-              <a:rPr lang="en-US" sz="1400" dirty="0" err="1" smtClean="0">
+              <a:rPr lang="en-US" sz="1400" dirty="0" err="1">
                 <a:solidFill>
                   <a:schemeClr val="bg1"/>
                 </a:solidFill>
@@ -2344,7 +2321,7 @@
               <a:t>mBlock</a:t>
             </a:r>
             <a:r>
-              <a:rPr lang="en-US" sz="1400" baseline="0" dirty="0" smtClean="0">
+              <a:rPr lang="en-US" sz="1400" baseline="0" dirty="0">
                 <a:solidFill>
                   <a:schemeClr val="bg1"/>
                 </a:solidFill>
@@ -2352,7 +2329,7 @@
               <a:t> Concept Cards </a:t>
             </a:r>
             <a:r>
-              <a:rPr lang="mr-IN" sz="1400" baseline="0" dirty="0" smtClean="0">
+              <a:rPr lang="mr-IN" sz="1400" baseline="0" dirty="0">
                 <a:solidFill>
                   <a:schemeClr val="bg1"/>
                 </a:solidFill>
@@ -2360,7 +2337,7 @@
               <a:t>–</a:t>
             </a:r>
             <a:r>
-              <a:rPr lang="en-US" sz="1400" baseline="0" dirty="0" smtClean="0">
+              <a:rPr lang="en-US" sz="1400" baseline="0" dirty="0">
                 <a:solidFill>
                   <a:schemeClr val="bg1"/>
                 </a:solidFill>
@@ -2368,7 +2345,7 @@
               <a:t> </a:t>
             </a:r>
             <a:r>
-              <a:rPr lang="en-US" sz="1400" baseline="0" dirty="0" err="1" smtClean="0">
+              <a:rPr lang="en-US" sz="1400" baseline="0" dirty="0" err="1">
                 <a:solidFill>
                   <a:schemeClr val="bg1"/>
                 </a:solidFill>
@@ -2376,7 +2353,7 @@
               <a:t>github</a:t>
             </a:r>
             <a:r>
-              <a:rPr lang="en-US" sz="1400" baseline="0" dirty="0" smtClean="0">
+              <a:rPr lang="en-US" sz="1400" baseline="0" dirty="0">
                 <a:solidFill>
                   <a:schemeClr val="bg1"/>
                 </a:solidFill>
@@ -2384,7 +2361,7 @@
               <a:t>/</a:t>
             </a:r>
             <a:r>
-              <a:rPr lang="en-US" sz="1400" baseline="0" dirty="0" err="1" smtClean="0">
+              <a:rPr lang="en-US" sz="1400" baseline="0" dirty="0" err="1">
                 <a:solidFill>
                   <a:schemeClr val="bg1"/>
                 </a:solidFill>
@@ -2392,7 +2369,7 @@
               <a:t>dmccreary</a:t>
             </a:r>
             <a:r>
-              <a:rPr lang="en-US" sz="1400" baseline="0" dirty="0" smtClean="0">
+              <a:rPr lang="en-US" sz="1400" baseline="0" dirty="0">
                 <a:solidFill>
                   <a:schemeClr val="bg1"/>
                 </a:solidFill>
@@ -2400,7 +2377,7 @@
               <a:t>/</a:t>
             </a:r>
             <a:r>
-              <a:rPr lang="en-US" sz="1400" baseline="0" dirty="0" err="1" smtClean="0">
+              <a:rPr lang="en-US" sz="1400" baseline="0" dirty="0" err="1">
                 <a:solidFill>
                   <a:schemeClr val="bg1"/>
                 </a:solidFill>
@@ -2408,7 +2385,7 @@
               <a:t>coderdojo</a:t>
             </a:r>
             <a:r>
-              <a:rPr lang="en-US" sz="1400" baseline="0" dirty="0" smtClean="0">
+              <a:rPr lang="en-US" sz="1400" baseline="0" dirty="0">
                 <a:solidFill>
                   <a:schemeClr val="bg1"/>
                 </a:solidFill>
@@ -2446,7 +2423,7 @@
           <a:lstStyle/>
           <a:p>
             <a:r>
-              <a:rPr lang="en-US" sz="1400" dirty="0" err="1" smtClean="0">
+              <a:rPr lang="en-US" sz="1400" dirty="0" err="1">
                 <a:solidFill>
                   <a:schemeClr val="bg1"/>
                 </a:solidFill>
@@ -2454,7 +2431,7 @@
               <a:t>mBlock</a:t>
             </a:r>
             <a:r>
-              <a:rPr lang="en-US" sz="1400" baseline="0" dirty="0" smtClean="0">
+              <a:rPr lang="en-US" sz="1400" baseline="0" dirty="0">
                 <a:solidFill>
                   <a:schemeClr val="bg1"/>
                 </a:solidFill>
@@ -2462,7 +2439,7 @@
               <a:t> Concept Cards </a:t>
             </a:r>
             <a:r>
-              <a:rPr lang="mr-IN" sz="1400" baseline="0" dirty="0" smtClean="0">
+              <a:rPr lang="mr-IN" sz="1400" baseline="0" dirty="0">
                 <a:solidFill>
                   <a:schemeClr val="bg1"/>
                 </a:solidFill>
@@ -2470,7 +2447,7 @@
               <a:t>–</a:t>
             </a:r>
             <a:r>
-              <a:rPr lang="en-US" sz="1400" baseline="0" dirty="0" smtClean="0">
+              <a:rPr lang="en-US" sz="1400" baseline="0" dirty="0">
                 <a:solidFill>
                   <a:schemeClr val="bg1"/>
                 </a:solidFill>
@@ -2478,7 +2455,7 @@
               <a:t> </a:t>
             </a:r>
             <a:r>
-              <a:rPr lang="en-US" sz="1400" baseline="0" dirty="0" err="1" smtClean="0">
+              <a:rPr lang="en-US" sz="1400" baseline="0" dirty="0" err="1">
                 <a:solidFill>
                   <a:schemeClr val="bg1"/>
                 </a:solidFill>
@@ -2486,7 +2463,7 @@
               <a:t>github</a:t>
             </a:r>
             <a:r>
-              <a:rPr lang="en-US" sz="1400" baseline="0" dirty="0" smtClean="0">
+              <a:rPr lang="en-US" sz="1400" baseline="0" dirty="0">
                 <a:solidFill>
                   <a:schemeClr val="bg1"/>
                 </a:solidFill>
@@ -2494,7 +2471,7 @@
               <a:t>/</a:t>
             </a:r>
             <a:r>
-              <a:rPr lang="en-US" sz="1400" baseline="0" dirty="0" err="1" smtClean="0">
+              <a:rPr lang="en-US" sz="1400" baseline="0" dirty="0" err="1">
                 <a:solidFill>
                   <a:schemeClr val="bg1"/>
                 </a:solidFill>
@@ -2502,7 +2479,7 @@
               <a:t>dmccreary</a:t>
             </a:r>
             <a:r>
-              <a:rPr lang="en-US" sz="1400" baseline="0" dirty="0" smtClean="0">
+              <a:rPr lang="en-US" sz="1400" baseline="0" dirty="0">
                 <a:solidFill>
                   <a:schemeClr val="bg1"/>
                 </a:solidFill>
@@ -2510,7 +2487,7 @@
               <a:t>/</a:t>
             </a:r>
             <a:r>
-              <a:rPr lang="en-US" sz="1400" baseline="0" dirty="0" err="1" smtClean="0">
+              <a:rPr lang="en-US" sz="1400" baseline="0" dirty="0" err="1">
                 <a:solidFill>
                   <a:schemeClr val="bg1"/>
                 </a:solidFill>
@@ -2518,7 +2495,7 @@
               <a:t>coderdojo</a:t>
             </a:r>
             <a:r>
-              <a:rPr lang="en-US" sz="1400" baseline="0" dirty="0" smtClean="0">
+              <a:rPr lang="en-US" sz="1400" baseline="0" dirty="0">
                 <a:solidFill>
                   <a:schemeClr val="bg1"/>
                 </a:solidFill>
@@ -2583,10 +2560,9 @@
           </a:lstStyle>
           <a:p>
             <a:r>
-              <a:rPr lang="en-US" smtClean="0"/>
+              <a:rPr lang="en-US"/>
               <a:t>Click to edit Master title style</a:t>
             </a:r>
-            <a:endParaRPr lang="en-US"/>
           </a:p>
         </p:txBody>
       </p:sp>
@@ -2648,10 +2624,9 @@
           </a:lstStyle>
           <a:p>
             <a:r>
-              <a:rPr lang="en-US" smtClean="0"/>
+              <a:rPr lang="en-US"/>
               <a:t>Click to edit Master subtitle style</a:t>
             </a:r>
-            <a:endParaRPr lang="en-US"/>
           </a:p>
         </p:txBody>
       </p:sp>
@@ -2672,7 +2647,7 @@
           <a:p>
             <a:fld id="{CE60EA3C-8612-9948-B395-77401CBBBD2E}" type="datetimeFigureOut">
               <a:rPr lang="en-US" smtClean="0"/>
-              <a:t>3/9/19</a:t>
+              <a:t>8/13/20</a:t>
             </a:fld>
             <a:endParaRPr lang="en-US"/>
           </a:p>
@@ -2766,10 +2741,9 @@
           <a:lstStyle/>
           <a:p>
             <a:r>
-              <a:rPr lang="en-US" smtClean="0"/>
+              <a:rPr lang="en-US"/>
               <a:t>Click to edit Master title style</a:t>
             </a:r>
-            <a:endParaRPr lang="en-US"/>
           </a:p>
         </p:txBody>
       </p:sp>
@@ -2790,38 +2764,37 @@
           <a:p>
             <a:pPr lvl="0"/>
             <a:r>
-              <a:rPr lang="en-US" smtClean="0"/>
+              <a:rPr lang="en-US"/>
               <a:t>Click to edit Master text styles</a:t>
             </a:r>
           </a:p>
           <a:p>
             <a:pPr lvl="1"/>
             <a:r>
-              <a:rPr lang="en-US" smtClean="0"/>
+              <a:rPr lang="en-US"/>
               <a:t>Second level</a:t>
             </a:r>
           </a:p>
           <a:p>
             <a:pPr lvl="2"/>
             <a:r>
-              <a:rPr lang="en-US" smtClean="0"/>
+              <a:rPr lang="en-US"/>
               <a:t>Third level</a:t>
             </a:r>
           </a:p>
           <a:p>
             <a:pPr lvl="3"/>
             <a:r>
-              <a:rPr lang="en-US" smtClean="0"/>
+              <a:rPr lang="en-US"/>
               <a:t>Fourth level</a:t>
             </a:r>
           </a:p>
           <a:p>
             <a:pPr lvl="4"/>
             <a:r>
-              <a:rPr lang="en-US" smtClean="0"/>
+              <a:rPr lang="en-US"/>
               <a:t>Fifth level</a:t>
             </a:r>
-            <a:endParaRPr lang="en-US"/>
           </a:p>
         </p:txBody>
       </p:sp>
@@ -2842,7 +2815,7 @@
           <a:p>
             <a:fld id="{CE60EA3C-8612-9948-B395-77401CBBBD2E}" type="datetimeFigureOut">
               <a:rPr lang="en-US" smtClean="0"/>
-              <a:t>3/9/19</a:t>
+              <a:t>8/13/20</a:t>
             </a:fld>
             <a:endParaRPr lang="en-US"/>
           </a:p>
@@ -2945,10 +2918,9 @@
           </a:lstStyle>
           <a:p>
             <a:r>
-              <a:rPr lang="en-US" smtClean="0"/>
+              <a:rPr lang="en-US"/>
               <a:t>Click to edit Master title style</a:t>
             </a:r>
-            <a:endParaRPr lang="en-US"/>
           </a:p>
         </p:txBody>
       </p:sp>
@@ -3065,7 +3037,7 @@
           <a:p>
             <a:pPr lvl="0"/>
             <a:r>
-              <a:rPr lang="en-US" smtClean="0"/>
+              <a:rPr lang="en-US"/>
               <a:t>Click to edit Master text styles</a:t>
             </a:r>
           </a:p>
@@ -3088,7 +3060,7 @@
           <a:p>
             <a:fld id="{CE60EA3C-8612-9948-B395-77401CBBBD2E}" type="datetimeFigureOut">
               <a:rPr lang="en-US" smtClean="0"/>
-              <a:t>3/9/19</a:t>
+              <a:t>8/13/20</a:t>
             </a:fld>
             <a:endParaRPr lang="en-US"/>
           </a:p>
@@ -3182,10 +3154,9 @@
           <a:lstStyle/>
           <a:p>
             <a:r>
-              <a:rPr lang="en-US" smtClean="0"/>
+              <a:rPr lang="en-US"/>
               <a:t>Click to edit Master title style</a:t>
             </a:r>
-            <a:endParaRPr lang="en-US"/>
           </a:p>
         </p:txBody>
       </p:sp>
@@ -3211,38 +3182,37 @@
           <a:p>
             <a:pPr lvl="0"/>
             <a:r>
-              <a:rPr lang="en-US" smtClean="0"/>
+              <a:rPr lang="en-US"/>
               <a:t>Click to edit Master text styles</a:t>
             </a:r>
           </a:p>
           <a:p>
             <a:pPr lvl="1"/>
             <a:r>
-              <a:rPr lang="en-US" smtClean="0"/>
+              <a:rPr lang="en-US"/>
               <a:t>Second level</a:t>
             </a:r>
           </a:p>
           <a:p>
             <a:pPr lvl="2"/>
             <a:r>
-              <a:rPr lang="en-US" smtClean="0"/>
+              <a:rPr lang="en-US"/>
               <a:t>Third level</a:t>
             </a:r>
           </a:p>
           <a:p>
             <a:pPr lvl="3"/>
             <a:r>
-              <a:rPr lang="en-US" smtClean="0"/>
+              <a:rPr lang="en-US"/>
               <a:t>Fourth level</a:t>
             </a:r>
           </a:p>
           <a:p>
             <a:pPr lvl="4"/>
             <a:r>
-              <a:rPr lang="en-US" smtClean="0"/>
+              <a:rPr lang="en-US"/>
               <a:t>Fifth level</a:t>
             </a:r>
-            <a:endParaRPr lang="en-US"/>
           </a:p>
         </p:txBody>
       </p:sp>
@@ -3268,38 +3238,37 @@
           <a:p>
             <a:pPr lvl="0"/>
             <a:r>
-              <a:rPr lang="en-US" smtClean="0"/>
+              <a:rPr lang="en-US"/>
               <a:t>Click to edit Master text styles</a:t>
             </a:r>
           </a:p>
           <a:p>
             <a:pPr lvl="1"/>
             <a:r>
-              <a:rPr lang="en-US" smtClean="0"/>
+              <a:rPr lang="en-US"/>
               <a:t>Second level</a:t>
             </a:r>
           </a:p>
           <a:p>
             <a:pPr lvl="2"/>
             <a:r>
-              <a:rPr lang="en-US" smtClean="0"/>
+              <a:rPr lang="en-US"/>
               <a:t>Third level</a:t>
             </a:r>
           </a:p>
           <a:p>
             <a:pPr lvl="3"/>
             <a:r>
-              <a:rPr lang="en-US" smtClean="0"/>
+              <a:rPr lang="en-US"/>
               <a:t>Fourth level</a:t>
             </a:r>
           </a:p>
           <a:p>
             <a:pPr lvl="4"/>
             <a:r>
-              <a:rPr lang="en-US" smtClean="0"/>
+              <a:rPr lang="en-US"/>
               <a:t>Fifth level</a:t>
             </a:r>
-            <a:endParaRPr lang="en-US"/>
           </a:p>
         </p:txBody>
       </p:sp>
@@ -3320,7 +3289,7 @@
           <a:p>
             <a:fld id="{CE60EA3C-8612-9948-B395-77401CBBBD2E}" type="datetimeFigureOut">
               <a:rPr lang="en-US" smtClean="0"/>
-              <a:t>3/9/19</a:t>
+              <a:t>8/13/20</a:t>
             </a:fld>
             <a:endParaRPr lang="en-US"/>
           </a:p>
@@ -3419,10 +3388,9 @@
           <a:lstStyle/>
           <a:p>
             <a:r>
-              <a:rPr lang="en-US" smtClean="0"/>
+              <a:rPr lang="en-US"/>
               <a:t>Click to edit Master title style</a:t>
             </a:r>
-            <a:endParaRPr lang="en-US"/>
           </a:p>
         </p:txBody>
       </p:sp>
@@ -3485,7 +3453,7 @@
           <a:p>
             <a:pPr lvl="0"/>
             <a:r>
-              <a:rPr lang="en-US" smtClean="0"/>
+              <a:rPr lang="en-US"/>
               <a:t>Click to edit Master text styles</a:t>
             </a:r>
           </a:p>
@@ -3513,38 +3481,37 @@
           <a:p>
             <a:pPr lvl="0"/>
             <a:r>
-              <a:rPr lang="en-US" smtClean="0"/>
+              <a:rPr lang="en-US"/>
               <a:t>Click to edit Master text styles</a:t>
             </a:r>
           </a:p>
           <a:p>
             <a:pPr lvl="1"/>
             <a:r>
-              <a:rPr lang="en-US" smtClean="0"/>
+              <a:rPr lang="en-US"/>
               <a:t>Second level</a:t>
             </a:r>
           </a:p>
           <a:p>
             <a:pPr lvl="2"/>
             <a:r>
-              <a:rPr lang="en-US" smtClean="0"/>
+              <a:rPr lang="en-US"/>
               <a:t>Third level</a:t>
             </a:r>
           </a:p>
           <a:p>
             <a:pPr lvl="3"/>
             <a:r>
-              <a:rPr lang="en-US" smtClean="0"/>
+              <a:rPr lang="en-US"/>
               <a:t>Fourth level</a:t>
             </a:r>
           </a:p>
           <a:p>
             <a:pPr lvl="4"/>
             <a:r>
-              <a:rPr lang="en-US" smtClean="0"/>
+              <a:rPr lang="en-US"/>
               <a:t>Fifth level</a:t>
             </a:r>
-            <a:endParaRPr lang="en-US"/>
           </a:p>
         </p:txBody>
       </p:sp>
@@ -3607,7 +3574,7 @@
           <a:p>
             <a:pPr lvl="0"/>
             <a:r>
-              <a:rPr lang="en-US" smtClean="0"/>
+              <a:rPr lang="en-US"/>
               <a:t>Click to edit Master text styles</a:t>
             </a:r>
           </a:p>
@@ -3635,38 +3602,37 @@
           <a:p>
             <a:pPr lvl="0"/>
             <a:r>
-              <a:rPr lang="en-US" smtClean="0"/>
+              <a:rPr lang="en-US"/>
               <a:t>Click to edit Master text styles</a:t>
             </a:r>
           </a:p>
           <a:p>
             <a:pPr lvl="1"/>
             <a:r>
-              <a:rPr lang="en-US" smtClean="0"/>
+              <a:rPr lang="en-US"/>
               <a:t>Second level</a:t>
             </a:r>
           </a:p>
           <a:p>
             <a:pPr lvl="2"/>
             <a:r>
-              <a:rPr lang="en-US" smtClean="0"/>
+              <a:rPr lang="en-US"/>
               <a:t>Third level</a:t>
             </a:r>
           </a:p>
           <a:p>
             <a:pPr lvl="3"/>
             <a:r>
-              <a:rPr lang="en-US" smtClean="0"/>
+              <a:rPr lang="en-US"/>
               <a:t>Fourth level</a:t>
             </a:r>
           </a:p>
           <a:p>
             <a:pPr lvl="4"/>
             <a:r>
-              <a:rPr lang="en-US" smtClean="0"/>
+              <a:rPr lang="en-US"/>
               <a:t>Fifth level</a:t>
             </a:r>
-            <a:endParaRPr lang="en-US"/>
           </a:p>
         </p:txBody>
       </p:sp>
@@ -3687,7 +3653,7 @@
           <a:p>
             <a:fld id="{CE60EA3C-8612-9948-B395-77401CBBBD2E}" type="datetimeFigureOut">
               <a:rPr lang="en-US" smtClean="0"/>
-              <a:t>3/9/19</a:t>
+              <a:t>8/13/20</a:t>
             </a:fld>
             <a:endParaRPr lang="en-US"/>
           </a:p>
@@ -3781,10 +3747,9 @@
           <a:lstStyle/>
           <a:p>
             <a:r>
-              <a:rPr lang="en-US" smtClean="0"/>
+              <a:rPr lang="en-US"/>
               <a:t>Click to edit Master title style</a:t>
             </a:r>
-            <a:endParaRPr lang="en-US"/>
           </a:p>
         </p:txBody>
       </p:sp>
@@ -3805,7 +3770,7 @@
           <a:p>
             <a:fld id="{CE60EA3C-8612-9948-B395-77401CBBBD2E}" type="datetimeFigureOut">
               <a:rPr lang="en-US" smtClean="0"/>
-              <a:t>3/9/19</a:t>
+              <a:t>8/13/20</a:t>
             </a:fld>
             <a:endParaRPr lang="en-US"/>
           </a:p>
@@ -3900,7 +3865,7 @@
           <a:p>
             <a:fld id="{CE60EA3C-8612-9948-B395-77401CBBBD2E}" type="datetimeFigureOut">
               <a:rPr lang="en-US" smtClean="0"/>
-              <a:t>3/9/19</a:t>
+              <a:t>8/13/20</a:t>
             </a:fld>
             <a:endParaRPr lang="en-US"/>
           </a:p>
@@ -4009,10 +3974,9 @@
           <a:lstStyle/>
           <a:p>
             <a:r>
-              <a:rPr lang="en-US" smtClean="0"/>
+              <a:rPr lang="en-US"/>
               <a:t>Click to edit Master title style</a:t>
             </a:r>
-            <a:endParaRPr lang="en-US"/>
           </a:p>
         </p:txBody>
       </p:sp>
@@ -4043,38 +4007,37 @@
           <a:p>
             <a:pPr lvl="0"/>
             <a:r>
-              <a:rPr lang="en-US" smtClean="0"/>
+              <a:rPr lang="en-US"/>
               <a:t>Click to edit Master text styles</a:t>
             </a:r>
           </a:p>
           <a:p>
             <a:pPr lvl="1"/>
             <a:r>
-              <a:rPr lang="en-US" smtClean="0"/>
+              <a:rPr lang="en-US"/>
               <a:t>Second level</a:t>
             </a:r>
           </a:p>
           <a:p>
             <a:pPr lvl="2"/>
             <a:r>
-              <a:rPr lang="en-US" smtClean="0"/>
+              <a:rPr lang="en-US"/>
               <a:t>Third level</a:t>
             </a:r>
           </a:p>
           <a:p>
             <a:pPr lvl="3"/>
             <a:r>
-              <a:rPr lang="en-US" smtClean="0"/>
+              <a:rPr lang="en-US"/>
               <a:t>Fourth level</a:t>
             </a:r>
           </a:p>
           <a:p>
             <a:pPr lvl="4"/>
             <a:r>
-              <a:rPr lang="en-US" smtClean="0"/>
+              <a:rPr lang="en-US"/>
               <a:t>Fifth level</a:t>
             </a:r>
-            <a:endParaRPr lang="en-US"/>
           </a:p>
         </p:txBody>
       </p:sp>
@@ -4113,7 +4076,7 @@
           <a:p>
             <a:fld id="{CE60EA3C-8612-9948-B395-77401CBBBD2E}" type="datetimeFigureOut">
               <a:rPr lang="en-US" smtClean="0"/>
-              <a:t>3/9/19</a:t>
+              <a:t>8/13/20</a:t>
             </a:fld>
             <a:endParaRPr lang="en-US"/>
           </a:p>
@@ -4567,7 +4530,7 @@
           <a:lstStyle/>
           <a:p>
             <a:r>
-              <a:rPr lang="en-US" dirty="0" smtClean="0"/>
+              <a:rPr lang="en-US" dirty="0"/>
               <a:t>The on board LED will turn green when you press the space bar.  Note the yellow flash that indicates the event happened.  The “o” key will turn the LED off.</a:t>
             </a:r>
           </a:p>
@@ -4576,10 +4539,9 @@
           </a:p>
           <a:p>
             <a:r>
-              <a:rPr lang="en-US" dirty="0" smtClean="0"/>
+              <a:rPr lang="en-US" dirty="0"/>
               <a:t>Can you chance the color?</a:t>
             </a:r>
-            <a:endParaRPr lang="en-US" dirty="0"/>
           </a:p>
         </p:txBody>
       </p:sp>
@@ -4606,14 +4568,13 @@
           <a:lstStyle/>
           <a:p>
             <a:r>
-              <a:rPr lang="en-US" b="1" smtClean="0"/>
+              <a:rPr lang="en-US" b="1"/>
               <a:t>Lab 1: Turn </a:t>
             </a:r>
             <a:r>
-              <a:rPr lang="en-US" b="1" dirty="0" smtClean="0"/>
+              <a:rPr lang="en-US" b="1" dirty="0"/>
               <a:t>LED On</a:t>
             </a:r>
-            <a:endParaRPr lang="en-US" b="1" dirty="0"/>
           </a:p>
         </p:txBody>
       </p:sp>
@@ -4640,14 +4601,13 @@
           <a:lstStyle/>
           <a:p>
             <a:r>
-              <a:rPr lang="en-US" b="1" smtClean="0"/>
+              <a:rPr lang="en-US" b="1"/>
               <a:t>Lab 2: Flash </a:t>
             </a:r>
             <a:r>
-              <a:rPr lang="en-US" b="1" dirty="0" smtClean="0"/>
+              <a:rPr lang="en-US" b="1" dirty="0"/>
               <a:t>LED (Blink Lab) </a:t>
             </a:r>
-            <a:endParaRPr lang="en-US" b="1" dirty="0"/>
           </a:p>
         </p:txBody>
       </p:sp>
@@ -4698,7 +4658,7 @@
           <a:lstStyle/>
           <a:p>
             <a:r>
-              <a:rPr lang="en-US" dirty="0" smtClean="0"/>
+              <a:rPr lang="en-US" dirty="0"/>
               <a:t>The on board LED will flash green when you press the space bar. </a:t>
             </a:r>
           </a:p>
@@ -4707,7 +4667,7 @@
           </a:p>
           <a:p>
             <a:r>
-              <a:rPr lang="en-US" dirty="0" smtClean="0"/>
+              <a:rPr lang="en-US" dirty="0"/>
               <a:t>Can you chance the speed that the LED flashes?  Note that the wait can contain a decimal value like 0.1 or 0.05.</a:t>
             </a:r>
           </a:p>
@@ -4716,26 +4676,25 @@
           </a:p>
           <a:p>
             <a:r>
-              <a:rPr lang="en-US" dirty="0" smtClean="0"/>
+              <a:rPr lang="en-US" dirty="0"/>
               <a:t>Advanced </a:t>
             </a:r>
             <a:r>
-              <a:rPr lang="mr-IN" dirty="0" smtClean="0"/>
+              <a:rPr lang="mr-IN" dirty="0"/>
               <a:t>–</a:t>
             </a:r>
             <a:r>
-              <a:rPr lang="en-US" dirty="0" smtClean="0"/>
+              <a:rPr lang="en-US" dirty="0"/>
               <a:t> why is there a limit on how fast the LEDs flash? (hint </a:t>
             </a:r>
             <a:r>
-              <a:rPr lang="mr-IN" dirty="0" smtClean="0"/>
+              <a:rPr lang="mr-IN" dirty="0"/>
               <a:t>–</a:t>
             </a:r>
             <a:r>
-              <a:rPr lang="en-US" dirty="0" smtClean="0"/>
+              <a:rPr lang="en-US" dirty="0"/>
               <a:t> is the command stream is a limiting factor)</a:t>
             </a:r>
-            <a:endParaRPr lang="en-US" dirty="0"/>
           </a:p>
         </p:txBody>
       </p:sp>
@@ -4792,10 +4751,9 @@
           <a:lstStyle/>
           <a:p>
             <a:r>
-              <a:rPr lang="en-US" dirty="0" smtClean="0"/>
+              <a:rPr lang="en-US" dirty="0"/>
               <a:t>We can change just the right or left LEDs.  Can you make both turn red, then the left green, then the right blue? </a:t>
             </a:r>
-            <a:endParaRPr lang="en-US" dirty="0"/>
           </a:p>
         </p:txBody>
       </p:sp>
@@ -4822,7 +4780,7 @@
           <a:lstStyle/>
           <a:p>
             <a:r>
-              <a:rPr lang="en-US" b="1" smtClean="0"/>
+              <a:rPr lang="en-US" b="1"/>
               <a:t>Lab 3: Left and Right LEDs</a:t>
             </a:r>
             <a:endParaRPr lang="en-US" b="1" dirty="0"/>
@@ -4852,14 +4810,13 @@
           <a:lstStyle/>
           <a:p>
             <a:r>
-              <a:rPr lang="en-US" b="1" smtClean="0"/>
+              <a:rPr lang="en-US" b="1"/>
               <a:t>Lab 4: Conditional </a:t>
             </a:r>
             <a:r>
-              <a:rPr lang="en-US" b="1" dirty="0" smtClean="0"/>
+              <a:rPr lang="en-US" b="1" dirty="0"/>
               <a:t>Ping</a:t>
             </a:r>
-            <a:endParaRPr lang="en-US" b="1" dirty="0"/>
           </a:p>
         </p:txBody>
       </p:sp>
@@ -4886,7 +4843,7 @@
           <a:lstStyle/>
           <a:p>
             <a:r>
-              <a:rPr lang="en-US" dirty="0" smtClean="0"/>
+              <a:rPr lang="en-US" dirty="0"/>
               <a:t>Robots can sense the world around them and then change their behavior.  Can you make the color change based on what is in front of the robot?</a:t>
             </a:r>
           </a:p>
@@ -4895,10 +4852,9 @@
           </a:p>
           <a:p>
             <a:r>
-              <a:rPr lang="en-US" dirty="0" smtClean="0"/>
+              <a:rPr lang="en-US" dirty="0"/>
               <a:t>How is this lab like a stoplight?  What does green show?</a:t>
             </a:r>
-            <a:endParaRPr lang="en-US" dirty="0"/>
           </a:p>
         </p:txBody>
       </p:sp>
@@ -5003,10 +4959,9 @@
           <a:lstStyle/>
           <a:p>
             <a:r>
-              <a:rPr lang="en-US" dirty="0" smtClean="0"/>
+              <a:rPr lang="en-US" dirty="0"/>
               <a:t>Green means there is nothing in front of us.  It means go forward.  But then block is detecting an obstacle in from of us.  Lets turn the different LEDs on to show that we need to turn to avoid a crash!</a:t>
             </a:r>
-            <a:endParaRPr lang="en-US" dirty="0"/>
           </a:p>
         </p:txBody>
       </p:sp>
@@ -5033,14 +4988,13 @@
           <a:lstStyle/>
           <a:p>
             <a:r>
-              <a:rPr lang="en-US" b="1" smtClean="0"/>
+              <a:rPr lang="en-US" b="1"/>
               <a:t>Lab 5: Green </a:t>
             </a:r>
             <a:r>
-              <a:rPr lang="en-US" b="1" dirty="0" smtClean="0"/>
+              <a:rPr lang="en-US" b="1" dirty="0"/>
               <a:t>Means Go!</a:t>
             </a:r>
-            <a:endParaRPr lang="en-US" b="1" dirty="0"/>
           </a:p>
         </p:txBody>
       </p:sp>
@@ -5067,14 +5021,13 @@
           <a:lstStyle/>
           <a:p>
             <a:r>
-              <a:rPr lang="en-US" b="1" smtClean="0"/>
+              <a:rPr lang="en-US" b="1"/>
               <a:t>Lab 6: Rainbow </a:t>
             </a:r>
             <a:r>
-              <a:rPr lang="en-US" b="1" dirty="0" smtClean="0"/>
+              <a:rPr lang="en-US" b="1" dirty="0"/>
               <a:t>Colors</a:t>
             </a:r>
-            <a:endParaRPr lang="en-US" b="1" dirty="0"/>
           </a:p>
         </p:txBody>
       </p:sp>
@@ -5149,7 +5102,7 @@
           <a:lstStyle/>
           <a:p>
             <a:r>
-              <a:rPr lang="en-US" dirty="0" smtClean="0"/>
+              <a:rPr lang="en-US" dirty="0"/>
               <a:t>What if you wanted your distance to change the color to more than two colors?  Here is an example that uses the and block to test if the sensor is within a range.</a:t>
             </a:r>
           </a:p>
@@ -5158,7 +5111,7 @@
           </a:p>
           <a:p>
             <a:r>
-              <a:rPr lang="en-US" dirty="0" smtClean="0"/>
+              <a:rPr lang="en-US" dirty="0"/>
               <a:t>Hint: to write this faster, use the duplicate (right click) to copy the if/then block.</a:t>
             </a:r>
           </a:p>
@@ -5167,10 +5120,9 @@
           </a:p>
           <a:p>
             <a:r>
-              <a:rPr lang="en-US" dirty="0" smtClean="0"/>
+              <a:rPr lang="en-US" dirty="0"/>
               <a:t>How many colors can you make?</a:t>
             </a:r>
-            <a:endParaRPr lang="en-US" dirty="0"/>
           </a:p>
         </p:txBody>
       </p:sp>
@@ -5227,15 +5179,15 @@
           <a:lstStyle/>
           <a:p>
             <a:r>
-              <a:rPr lang="en-US" dirty="0" smtClean="0"/>
+              <a:rPr lang="en-US" dirty="0"/>
               <a:t>The </a:t>
             </a:r>
             <a:r>
-              <a:rPr lang="en-US" dirty="0" err="1" smtClean="0"/>
+              <a:rPr lang="en-US" dirty="0" err="1"/>
               <a:t>mBot</a:t>
             </a:r>
             <a:r>
-              <a:rPr lang="en-US" dirty="0" smtClean="0"/>
+              <a:rPr lang="en-US" dirty="0"/>
               <a:t> has a light sensor on the top.  The program above will change the LED color based on how much light is hitting the robot.</a:t>
             </a:r>
           </a:p>
@@ -5244,10 +5196,9 @@
           </a:p>
           <a:p>
             <a:r>
-              <a:rPr lang="en-US" dirty="0" smtClean="0"/>
+              <a:rPr lang="en-US" dirty="0"/>
               <a:t>Do you think the LEDs will change the value of the light sensor?</a:t>
             </a:r>
-            <a:endParaRPr lang="en-US" dirty="0"/>
           </a:p>
         </p:txBody>
       </p:sp>
@@ -5274,10 +5225,9 @@
           <a:lstStyle/>
           <a:p>
             <a:r>
-              <a:rPr lang="en-US" b="1" dirty="0" smtClean="0"/>
+              <a:rPr lang="en-US" b="1" dirty="0"/>
               <a:t>7: Light Sensor Lab</a:t>
             </a:r>
-            <a:endParaRPr lang="en-US" b="1" dirty="0"/>
           </a:p>
         </p:txBody>
       </p:sp>
@@ -5304,10 +5254,9 @@
           <a:lstStyle/>
           <a:p>
             <a:r>
-              <a:rPr lang="en-US" b="1" dirty="0" smtClean="0"/>
+              <a:rPr lang="en-US" b="1" dirty="0"/>
               <a:t>Lab 8: Line Follower Lab</a:t>
             </a:r>
-            <a:endParaRPr lang="en-US" b="1" dirty="0"/>
           </a:p>
         </p:txBody>
       </p:sp>
@@ -5382,26 +5331,25 @@
           <a:lstStyle/>
           <a:p>
             <a:r>
-              <a:rPr lang="en-US" dirty="0" smtClean="0"/>
+              <a:rPr lang="en-US" dirty="0"/>
               <a:t>The </a:t>
             </a:r>
             <a:r>
-              <a:rPr lang="en-US" dirty="0" err="1" smtClean="0"/>
+              <a:rPr lang="en-US" dirty="0" err="1"/>
               <a:t>mBot</a:t>
             </a:r>
             <a:r>
-              <a:rPr lang="en-US" dirty="0" smtClean="0"/>
+              <a:rPr lang="en-US" dirty="0"/>
               <a:t> has a two line followers on the bottom of the robot.  There are robot blocks that return true or false if the robot is above a white or black object.  Run the program above and note when the blue LEDs on the </a:t>
             </a:r>
             <a:r>
-              <a:rPr lang="en-US" dirty="0" err="1" smtClean="0"/>
+              <a:rPr lang="en-US" dirty="0" err="1"/>
               <a:t>mBot</a:t>
             </a:r>
             <a:r>
-              <a:rPr lang="en-US" dirty="0" smtClean="0"/>
+              <a:rPr lang="en-US" dirty="0"/>
               <a:t> turn on and off.  How far above white paper do the sensors need to be to work?</a:t>
             </a:r>
-            <a:endParaRPr lang="en-US" dirty="0"/>
           </a:p>
         </p:txBody>
       </p:sp>
@@ -5458,7 +5406,7 @@
           <a:lstStyle/>
           <a:p>
             <a:r>
-              <a:rPr lang="en-US" dirty="0" smtClean="0"/>
+              <a:rPr lang="en-US" dirty="0"/>
               <a:t>Before we do this lab, put your robot on the floor!  This way it will not drive off the table and crash.</a:t>
             </a:r>
           </a:p>
@@ -5467,10 +5415,9 @@
           </a:p>
           <a:p>
             <a:r>
-              <a:rPr lang="en-US" dirty="0" smtClean="0"/>
+              <a:rPr lang="en-US" dirty="0"/>
               <a:t>This lab requires your robot to drive in a square.  You must press “g” for it to start.  The space bar will stop both motors.</a:t>
             </a:r>
-            <a:endParaRPr lang="en-US" dirty="0"/>
           </a:p>
         </p:txBody>
       </p:sp>
@@ -5497,14 +5444,13 @@
           <a:lstStyle/>
           <a:p>
             <a:r>
-              <a:rPr lang="en-US" b="1" smtClean="0"/>
+              <a:rPr lang="en-US" b="1"/>
               <a:t>Lab 9</a:t>
             </a:r>
             <a:r>
-              <a:rPr lang="en-US" b="1" dirty="0" smtClean="0"/>
+              <a:rPr lang="en-US" b="1" dirty="0"/>
               <a:t>: Drive in a Square</a:t>
             </a:r>
-            <a:endParaRPr lang="en-US" b="1" dirty="0"/>
           </a:p>
         </p:txBody>
       </p:sp>
@@ -5517,7 +5463,7 @@
         <p:spPr>
           <a:xfrm>
             <a:off x="7751259" y="812099"/>
-            <a:ext cx="2661754" cy="369332"/>
+            <a:ext cx="2776979" cy="369332"/>
           </a:xfrm>
           <a:prstGeom prst="rect">
             <a:avLst/>
@@ -5531,10 +5477,13 @@
           <a:lstStyle/>
           <a:p>
             <a:r>
-              <a:rPr lang="en-US" b="1" dirty="0" smtClean="0"/>
-              <a:t>Lab 7: Collision Avoidance</a:t>
-            </a:r>
-            <a:endParaRPr lang="en-US" b="1" dirty="0"/>
+              <a:rPr lang="en-US" b="1"/>
+              <a:t>Lab 10: </a:t>
+            </a:r>
+            <a:r>
+              <a:rPr lang="en-US" b="1" dirty="0"/>
+              <a:t>Collision Avoidance</a:t>
+            </a:r>
           </a:p>
         </p:txBody>
       </p:sp>
@@ -5585,7 +5534,7 @@
           <a:lstStyle/>
           <a:p>
             <a:r>
-              <a:rPr lang="en-US" dirty="0" smtClean="0"/>
+              <a:rPr lang="en-US" dirty="0"/>
               <a:t>Make the robot go forward until it gets close to an obstacle.  Then turn right.</a:t>
             </a:r>
           </a:p>
@@ -5594,10 +5543,9 @@
           </a:p>
           <a:p>
             <a:r>
-              <a:rPr lang="en-US" dirty="0" smtClean="0"/>
+              <a:rPr lang="en-US" dirty="0"/>
               <a:t>Can you make the robot back up first and then turn when there is an obstacle in front of it?</a:t>
             </a:r>
-            <a:endParaRPr lang="en-US" dirty="0"/>
           </a:p>
         </p:txBody>
       </p:sp>

</xml_diff>